<commit_message>
removed module info % JavaFX SRC
</commit_message>
<xml_diff>
--- a/CIMS_Deliverables.pptx
+++ b/CIMS_Deliverables.pptx
@@ -252,7 +252,7 @@
   <pc:docChgLst>
     <pc:chgData name="David Dugan" userId="3832c9847a5a5709" providerId="LiveId" clId="{672E13CA-793E-4AAC-8600-4D455CE75F65}"/>
     <pc:docChg chg="undo redo custSel addSld delSld modSld addSection delSection modSection">
-      <pc:chgData name="David Dugan" userId="3832c9847a5a5709" providerId="LiveId" clId="{672E13CA-793E-4AAC-8600-4D455CE75F65}" dt="2024-07-01T12:59:58.949" v="4277" actId="20577"/>
+      <pc:chgData name="David Dugan" userId="3832c9847a5a5709" providerId="LiveId" clId="{672E13CA-793E-4AAC-8600-4D455CE75F65}" dt="2024-07-08T14:08:11.898" v="4316" actId="26606"/>
       <pc:docMkLst>
         <pc:docMk/>
       </pc:docMkLst>
@@ -2549,7 +2549,7 @@
         </pc:picChg>
       </pc:sldChg>
       <pc:sldChg chg="addSp delSp modSp new mod setBg setFolMasterObjs setClrOvrMap">
-        <pc:chgData name="David Dugan" userId="3832c9847a5a5709" providerId="LiveId" clId="{672E13CA-793E-4AAC-8600-4D455CE75F65}" dt="2024-07-01T05:40:57.782" v="4243" actId="26606"/>
+        <pc:chgData name="David Dugan" userId="3832c9847a5a5709" providerId="LiveId" clId="{672E13CA-793E-4AAC-8600-4D455CE75F65}" dt="2024-07-08T14:08:11.898" v="4316" actId="26606"/>
         <pc:sldMkLst>
           <pc:docMk/>
           <pc:sldMk cId="2181544156" sldId="290"/>
@@ -2690,16 +2690,24 @@
             <ac:spMk id="28" creationId="{40155665-7CE2-4939-AE5E-020DC1D20753}"/>
           </ac:spMkLst>
         </pc:spChg>
-        <pc:spChg chg="add">
-          <ac:chgData name="David Dugan" userId="3832c9847a5a5709" providerId="LiveId" clId="{672E13CA-793E-4AAC-8600-4D455CE75F65}" dt="2024-07-01T05:40:57.782" v="4243" actId="26606"/>
+        <pc:spChg chg="add del">
+          <ac:chgData name="David Dugan" userId="3832c9847a5a5709" providerId="LiveId" clId="{672E13CA-793E-4AAC-8600-4D455CE75F65}" dt="2024-07-08T14:08:11.898" v="4316" actId="26606"/>
           <ac:spMkLst>
             <pc:docMk/>
             <pc:sldMk cId="2181544156" sldId="290"/>
             <ac:spMk id="30" creationId="{3DB0ED7D-0741-41C8-9BCD-85B80680FB6C}"/>
           </ac:spMkLst>
         </pc:spChg>
+        <pc:spChg chg="add">
+          <ac:chgData name="David Dugan" userId="3832c9847a5a5709" providerId="LiveId" clId="{672E13CA-793E-4AAC-8600-4D455CE75F65}" dt="2024-07-08T14:08:11.898" v="4316" actId="26606"/>
+          <ac:spMkLst>
+            <pc:docMk/>
+            <pc:sldMk cId="2181544156" sldId="290"/>
+            <ac:spMk id="35" creationId="{3DB0ED7D-0741-41C8-9BCD-85B80680FB6C}"/>
+          </ac:spMkLst>
+        </pc:spChg>
         <pc:graphicFrameChg chg="add mod modGraphic">
-          <ac:chgData name="David Dugan" userId="3832c9847a5a5709" providerId="LiveId" clId="{672E13CA-793E-4AAC-8600-4D455CE75F65}" dt="2024-07-01T05:40:57.782" v="4243" actId="26606"/>
+          <ac:chgData name="David Dugan" userId="3832c9847a5a5709" providerId="LiveId" clId="{672E13CA-793E-4AAC-8600-4D455CE75F65}" dt="2024-07-08T14:08:11.898" v="4316" actId="26606"/>
           <ac:graphicFrameMkLst>
             <pc:docMk/>
             <pc:sldMk cId="2181544156" sldId="290"/>
@@ -6523,7 +6531,7 @@
           <a:p>
             <a:fld id="{0F0F0DC3-8DBD-46F7-9F1B-37AA9822022D}" type="datetimeFigureOut">
               <a:rPr lang="en-US" smtClean="0"/>
-              <a:t>7/1/2024</a:t>
+              <a:t>7/8/2024</a:t>
             </a:fld>
             <a:endParaRPr lang="en-US"/>
           </a:p>
@@ -7800,7 +7808,7 @@
           <a:p>
             <a:fld id="{33009570-9CCC-41D7-BF92-D81CD7E459F9}" type="datetimeFigureOut">
               <a:rPr lang="en-US" smtClean="0"/>
-              <a:t>7/1/2024</a:t>
+              <a:t>7/8/2024</a:t>
             </a:fld>
             <a:endParaRPr lang="en-US"/>
           </a:p>
@@ -8888,7 +8896,7 @@
           <a:p>
             <a:fld id="{33009570-9CCC-41D7-BF92-D81CD7E459F9}" type="datetimeFigureOut">
               <a:rPr lang="en-US" smtClean="0"/>
-              <a:t>7/1/2024</a:t>
+              <a:t>7/8/2024</a:t>
             </a:fld>
             <a:endParaRPr lang="en-US"/>
           </a:p>
@@ -9868,7 +9876,7 @@
           <a:p>
             <a:fld id="{33009570-9CCC-41D7-BF92-D81CD7E459F9}" type="datetimeFigureOut">
               <a:rPr lang="en-US" smtClean="0"/>
-              <a:t>7/1/2024</a:t>
+              <a:t>7/8/2024</a:t>
             </a:fld>
             <a:endParaRPr lang="en-US"/>
           </a:p>
@@ -11002,7 +11010,7 @@
           <a:p>
             <a:fld id="{33009570-9CCC-41D7-BF92-D81CD7E459F9}" type="datetimeFigureOut">
               <a:rPr lang="en-US" smtClean="0"/>
-              <a:t>7/1/2024</a:t>
+              <a:t>7/8/2024</a:t>
             </a:fld>
             <a:endParaRPr lang="en-US"/>
           </a:p>
@@ -12035,7 +12043,7 @@
           <a:p>
             <a:fld id="{33009570-9CCC-41D7-BF92-D81CD7E459F9}" type="datetimeFigureOut">
               <a:rPr lang="en-US" smtClean="0"/>
-              <a:t>7/1/2024</a:t>
+              <a:t>7/8/2024</a:t>
             </a:fld>
             <a:endParaRPr lang="en-US"/>
           </a:p>
@@ -12695,7 +12703,7 @@
           <a:p>
             <a:fld id="{33009570-9CCC-41D7-BF92-D81CD7E459F9}" type="datetimeFigureOut">
               <a:rPr lang="en-US" smtClean="0"/>
-              <a:t>7/1/2024</a:t>
+              <a:t>7/8/2024</a:t>
             </a:fld>
             <a:endParaRPr lang="en-US"/>
           </a:p>
@@ -13556,7 +13564,7 @@
           <a:p>
             <a:fld id="{33009570-9CCC-41D7-BF92-D81CD7E459F9}" type="datetimeFigureOut">
               <a:rPr lang="en-US" smtClean="0"/>
-              <a:t>7/1/2024</a:t>
+              <a:t>7/8/2024</a:t>
             </a:fld>
             <a:endParaRPr lang="en-US"/>
           </a:p>
@@ -13746,7 +13754,7 @@
           <a:p>
             <a:fld id="{33009570-9CCC-41D7-BF92-D81CD7E459F9}" type="datetimeFigureOut">
               <a:rPr lang="en-US" smtClean="0"/>
-              <a:t>7/1/2024</a:t>
+              <a:t>7/8/2024</a:t>
             </a:fld>
             <a:endParaRPr lang="en-US"/>
           </a:p>
@@ -14718,7 +14726,7 @@
           <a:p>
             <a:fld id="{33009570-9CCC-41D7-BF92-D81CD7E459F9}" type="datetimeFigureOut">
               <a:rPr lang="en-US" smtClean="0"/>
-              <a:t>7/1/2024</a:t>
+              <a:t>7/8/2024</a:t>
             </a:fld>
             <a:endParaRPr lang="en-US"/>
           </a:p>
@@ -14929,7 +14937,7 @@
           <a:p>
             <a:fld id="{33009570-9CCC-41D7-BF92-D81CD7E459F9}" type="datetimeFigureOut">
               <a:rPr lang="en-US" smtClean="0"/>
-              <a:t>7/1/2024</a:t>
+              <a:t>7/8/2024</a:t>
             </a:fld>
             <a:endParaRPr lang="en-US"/>
           </a:p>
@@ -15963,7 +15971,7 @@
           <a:p>
             <a:fld id="{33009570-9CCC-41D7-BF92-D81CD7E459F9}" type="datetimeFigureOut">
               <a:rPr lang="en-US" smtClean="0"/>
-              <a:t>7/1/2024</a:t>
+              <a:t>7/8/2024</a:t>
             </a:fld>
             <a:endParaRPr lang="en-US"/>
           </a:p>
@@ -16235,7 +16243,7 @@
           <a:p>
             <a:fld id="{33009570-9CCC-41D7-BF92-D81CD7E459F9}" type="datetimeFigureOut">
               <a:rPr lang="en-US" smtClean="0"/>
-              <a:t>7/1/2024</a:t>
+              <a:t>7/8/2024</a:t>
             </a:fld>
             <a:endParaRPr lang="en-US"/>
           </a:p>
@@ -16645,7 +16653,7 @@
           <a:p>
             <a:fld id="{33009570-9CCC-41D7-BF92-D81CD7E459F9}" type="datetimeFigureOut">
               <a:rPr lang="en-US" smtClean="0"/>
-              <a:t>7/1/2024</a:t>
+              <a:t>7/8/2024</a:t>
             </a:fld>
             <a:endParaRPr lang="en-US"/>
           </a:p>
@@ -16772,7 +16780,7 @@
           <a:p>
             <a:fld id="{33009570-9CCC-41D7-BF92-D81CD7E459F9}" type="datetimeFigureOut">
               <a:rPr lang="en-US" smtClean="0"/>
-              <a:t>7/1/2024</a:t>
+              <a:t>7/8/2024</a:t>
             </a:fld>
             <a:endParaRPr lang="en-US"/>
           </a:p>
@@ -16867,7 +16875,7 @@
           <a:p>
             <a:fld id="{33009570-9CCC-41D7-BF92-D81CD7E459F9}" type="datetimeFigureOut">
               <a:rPr lang="en-US" smtClean="0"/>
-              <a:t>7/1/2024</a:t>
+              <a:t>7/8/2024</a:t>
             </a:fld>
             <a:endParaRPr lang="en-US"/>
           </a:p>
@@ -17948,7 +17956,7 @@
           <a:p>
             <a:fld id="{33009570-9CCC-41D7-BF92-D81CD7E459F9}" type="datetimeFigureOut">
               <a:rPr lang="en-US" smtClean="0"/>
-              <a:t>7/1/2024</a:t>
+              <a:t>7/8/2024</a:t>
             </a:fld>
             <a:endParaRPr lang="en-US"/>
           </a:p>
@@ -19056,7 +19064,7 @@
           <a:p>
             <a:fld id="{33009570-9CCC-41D7-BF92-D81CD7E459F9}" type="datetimeFigureOut">
               <a:rPr lang="en-US" smtClean="0"/>
-              <a:t>7/1/2024</a:t>
+              <a:t>7/8/2024</a:t>
             </a:fld>
             <a:endParaRPr lang="en-US"/>
           </a:p>
@@ -20053,7 +20061,7 @@
           <a:p>
             <a:fld id="{33009570-9CCC-41D7-BF92-D81CD7E459F9}" type="datetimeFigureOut">
               <a:rPr lang="en-US" smtClean="0"/>
-              <a:t>7/1/2024</a:t>
+              <a:t>7/8/2024</a:t>
             </a:fld>
             <a:endParaRPr lang="en-US"/>
           </a:p>
@@ -36490,7 +36498,7 @@
       </p:grpSpPr>
       <p:sp>
         <p:nvSpPr>
-          <p:cNvPr id="30" name="Rectangle 29">
+          <p:cNvPr id="35" name="Rectangle 34">
             <a:extLst>
               <a:ext uri="{FF2B5EF4-FFF2-40B4-BE49-F238E27FC236}">
                 <a16:creationId xmlns:a16="http://schemas.microsoft.com/office/drawing/2014/main" id="{3DB0ED7D-0741-41C8-9BCD-85B80680FB6C}"/>
@@ -36566,14 +36574,14 @@
           <p:nvPr>
             <p:extLst>
               <p:ext uri="{D42A27DB-BD31-4B8C-83A1-F6EECF244321}">
-                <p14:modId xmlns:p14="http://schemas.microsoft.com/office/powerpoint/2010/main" val="767738106"/>
+                <p14:modId xmlns:p14="http://schemas.microsoft.com/office/powerpoint/2010/main" val="3063701712"/>
               </p:ext>
             </p:extLst>
           </p:nvPr>
         </p:nvGraphicFramePr>
         <p:xfrm>
-          <a:off x="643467" y="989911"/>
-          <a:ext cx="10905069" cy="5171790"/>
+          <a:off x="643467" y="1140137"/>
+          <a:ext cx="10905068" cy="4865175"/>
         </p:xfrm>
         <a:graphic>
           <a:graphicData uri="http://schemas.openxmlformats.org/drawingml/2006/table">
@@ -36582,28 +36590,28 @@
                 <a:tableStyleId>{5C22544A-7EE6-4342-B048-85BDC9FD1C3A}</a:tableStyleId>
               </a:tblPr>
               <a:tblGrid>
-                <a:gridCol w="1167191">
+                <a:gridCol w="1118359">
                   <a:extLst>
                     <a:ext uri="{9D8B030D-6E8A-4147-A177-3AD203B41FA5}">
                       <a16:colId xmlns:a16="http://schemas.microsoft.com/office/drawing/2014/main" val="3101431725"/>
                     </a:ext>
                   </a:extLst>
                 </a:gridCol>
-                <a:gridCol w="7018539">
+                <a:gridCol w="6655757">
                   <a:extLst>
                     <a:ext uri="{9D8B030D-6E8A-4147-A177-3AD203B41FA5}">
                       <a16:colId xmlns:a16="http://schemas.microsoft.com/office/drawing/2014/main" val="1432341374"/>
                     </a:ext>
                   </a:extLst>
                 </a:gridCol>
-                <a:gridCol w="1552148">
+                <a:gridCol w="1547411">
                   <a:extLst>
                     <a:ext uri="{9D8B030D-6E8A-4147-A177-3AD203B41FA5}">
                       <a16:colId xmlns:a16="http://schemas.microsoft.com/office/drawing/2014/main" val="1289448117"/>
                     </a:ext>
                   </a:extLst>
                 </a:gridCol>
-                <a:gridCol w="1167191">
+                <a:gridCol w="1583541">
                   <a:extLst>
                     <a:ext uri="{9D8B030D-6E8A-4147-A177-3AD203B41FA5}">
                       <a16:colId xmlns:a16="http://schemas.microsoft.com/office/drawing/2014/main" val="548260758"/>
@@ -36611,19 +36619,19 @@
                   </a:extLst>
                 </a:gridCol>
               </a:tblGrid>
-              <a:tr h="487818">
+              <a:tr h="457773">
                 <a:tc>
                   <a:txBody>
                     <a:bodyPr/>
                     <a:lstStyle/>
                     <a:p>
                       <a:r>
-                        <a:rPr lang="en-US" sz="2200"/>
+                        <a:rPr lang="en-US" sz="2100"/>
                         <a:t>Phase</a:t>
                       </a:r>
                     </a:p>
                   </a:txBody>
-                  <a:tcPr marL="110868" marR="110868" marT="55434" marB="55434"/>
+                  <a:tcPr marL="105137" marR="105137" marT="52569" marB="52569"/>
                 </a:tc>
                 <a:tc>
                   <a:txBody>
@@ -36631,12 +36639,12 @@
                     <a:lstStyle/>
                     <a:p>
                       <a:r>
-                        <a:rPr lang="en-US" sz="2200"/>
+                        <a:rPr lang="en-US" sz="2100"/>
                         <a:t>Task</a:t>
                       </a:r>
                     </a:p>
                   </a:txBody>
-                  <a:tcPr marL="110868" marR="110868" marT="55434" marB="55434"/>
+                  <a:tcPr marL="105137" marR="105137" marT="52569" marB="52569"/>
                 </a:tc>
                 <a:tc>
                   <a:txBody>
@@ -36644,12 +36652,12 @@
                     <a:lstStyle/>
                     <a:p>
                       <a:r>
-                        <a:rPr lang="en-US" sz="2200"/>
+                        <a:rPr lang="en-US" sz="2100"/>
                         <a:t>Due Date</a:t>
                       </a:r>
                     </a:p>
                   </a:txBody>
-                  <a:tcPr marL="110868" marR="110868" marT="55434" marB="55434"/>
+                  <a:tcPr marL="105137" marR="105137" marT="52569" marB="52569"/>
                 </a:tc>
                 <a:tc>
                   <a:txBody>
@@ -36657,12 +36665,12 @@
                     <a:lstStyle/>
                     <a:p>
                       <a:r>
-                        <a:rPr lang="en-US" sz="2200"/>
+                        <a:rPr lang="en-US" sz="2100"/>
                         <a:t>Status</a:t>
                       </a:r>
                     </a:p>
                   </a:txBody>
-                  <a:tcPr marL="110868" marR="110868" marT="55434" marB="55434"/>
+                  <a:tcPr marL="105137" marR="105137" marT="52569" marB="52569"/>
                 </a:tc>
                 <a:extLst>
                   <a:ext uri="{0D108BD9-81ED-4DB2-BD59-A6C34878D82A}">
@@ -36670,19 +36678,19 @@
                   </a:ext>
                 </a:extLst>
               </a:tr>
-              <a:tr h="487818">
+              <a:tr h="457773">
                 <a:tc rowSpan="3">
                   <a:txBody>
                     <a:bodyPr/>
                     <a:lstStyle/>
                     <a:p>
                       <a:r>
-                        <a:rPr lang="en-US" sz="2200"/>
+                        <a:rPr lang="en-US" sz="2100"/>
                         <a:t>1</a:t>
                       </a:r>
                     </a:p>
                   </a:txBody>
-                  <a:tcPr marL="110868" marR="110868" marT="55434" marB="55434"/>
+                  <a:tcPr marL="105137" marR="105137" marT="52569" marB="52569"/>
                 </a:tc>
                 <a:tc>
                   <a:txBody>
@@ -36690,12 +36698,12 @@
                     <a:lstStyle/>
                     <a:p>
                       <a:r>
-                        <a:rPr lang="en-US" sz="2200"/>
+                        <a:rPr lang="en-US" sz="2100"/>
                         <a:t>Build Database</a:t>
                       </a:r>
                     </a:p>
                   </a:txBody>
-                  <a:tcPr marL="110868" marR="110868" marT="55434" marB="55434"/>
+                  <a:tcPr marL="105137" marR="105137" marT="52569" marB="52569"/>
                 </a:tc>
                 <a:tc>
                   <a:txBody>
@@ -36703,22 +36711,26 @@
                     <a:lstStyle/>
                     <a:p>
                       <a:r>
-                        <a:rPr lang="en-US" sz="2200"/>
+                        <a:rPr lang="en-US" sz="2100" dirty="0"/>
                         <a:t>7/7</a:t>
                       </a:r>
                     </a:p>
                   </a:txBody>
-                  <a:tcPr marL="110868" marR="110868" marT="55434" marB="55434"/>
+                  <a:tcPr marL="105137" marR="105137" marT="52569" marB="52569"/>
                 </a:tc>
                 <a:tc>
                   <a:txBody>
                     <a:bodyPr/>
                     <a:lstStyle/>
                     <a:p>
-                      <a:endParaRPr lang="en-US" sz="2200"/>
+                      <a:r>
+                        <a:rPr lang="en-US" sz="1900"/>
+                        <a:t>COMPLETE</a:t>
+                      </a:r>
+                      <a:endParaRPr lang="en-US" sz="2100"/>
                     </a:p>
                   </a:txBody>
-                  <a:tcPr marL="110868" marR="110868" marT="55434" marB="55434"/>
+                  <a:tcPr marL="105137" marR="105137" marT="52569" marB="52569"/>
                 </a:tc>
                 <a:extLst>
                   <a:ext uri="{0D108BD9-81ED-4DB2-BD59-A6C34878D82A}">
@@ -36726,7 +36738,7 @@
                   </a:ext>
                 </a:extLst>
               </a:tr>
-              <a:tr h="487818">
+              <a:tr h="457773">
                 <a:tc vMerge="1">
                   <a:txBody>
                     <a:bodyPr/>
@@ -36743,12 +36755,12 @@
                     <a:lstStyle/>
                     <a:p>
                       <a:r>
-                        <a:rPr lang="en-US" sz="2200"/>
+                        <a:rPr lang="en-US" sz="2100"/>
                         <a:t>Create Template Pages</a:t>
                       </a:r>
                     </a:p>
                   </a:txBody>
-                  <a:tcPr marL="110868" marR="110868" marT="55434" marB="55434"/>
+                  <a:tcPr marL="105137" marR="105137" marT="52569" marB="52569"/>
                 </a:tc>
                 <a:tc>
                   <a:txBody>
@@ -36756,22 +36768,22 @@
                     <a:lstStyle/>
                     <a:p>
                       <a:r>
-                        <a:rPr lang="en-US" sz="2200"/>
+                        <a:rPr lang="en-US" sz="2100"/>
                         <a:t>7/7</a:t>
                       </a:r>
                     </a:p>
                   </a:txBody>
-                  <a:tcPr marL="110868" marR="110868" marT="55434" marB="55434"/>
+                  <a:tcPr marL="105137" marR="105137" marT="52569" marB="52569"/>
                 </a:tc>
                 <a:tc>
                   <a:txBody>
                     <a:bodyPr/>
                     <a:lstStyle/>
                     <a:p>
-                      <a:endParaRPr lang="en-US" sz="2200"/>
+                      <a:endParaRPr lang="en-US" sz="2100"/>
                     </a:p>
                   </a:txBody>
-                  <a:tcPr marL="110868" marR="110868" marT="55434" marB="55434"/>
+                  <a:tcPr marL="105137" marR="105137" marT="52569" marB="52569"/>
                 </a:tc>
                 <a:extLst>
                   <a:ext uri="{0D108BD9-81ED-4DB2-BD59-A6C34878D82A}">
@@ -36779,7 +36791,7 @@
                   </a:ext>
                 </a:extLst>
               </a:tr>
-              <a:tr h="487818">
+              <a:tr h="457773">
                 <a:tc vMerge="1">
                   <a:txBody>
                     <a:bodyPr/>
@@ -36796,12 +36808,12 @@
                     <a:lstStyle/>
                     <a:p>
                       <a:r>
-                        <a:rPr lang="en-US" sz="2200"/>
+                        <a:rPr lang="en-US" sz="2100"/>
                         <a:t>Connect Database</a:t>
                       </a:r>
                     </a:p>
                   </a:txBody>
-                  <a:tcPr marL="110868" marR="110868" marT="55434" marB="55434"/>
+                  <a:tcPr marL="105137" marR="105137" marT="52569" marB="52569"/>
                 </a:tc>
                 <a:tc>
                   <a:txBody>
@@ -36809,22 +36821,22 @@
                     <a:lstStyle/>
                     <a:p>
                       <a:r>
-                        <a:rPr lang="en-US" sz="2200"/>
+                        <a:rPr lang="en-US" sz="2100"/>
                         <a:t>7/7</a:t>
                       </a:r>
                     </a:p>
                   </a:txBody>
-                  <a:tcPr marL="110868" marR="110868" marT="55434" marB="55434"/>
+                  <a:tcPr marL="105137" marR="105137" marT="52569" marB="52569"/>
                 </a:tc>
                 <a:tc>
                   <a:txBody>
                     <a:bodyPr/>
                     <a:lstStyle/>
                     <a:p>
-                      <a:endParaRPr lang="en-US" sz="2200"/>
+                      <a:endParaRPr lang="en-US" sz="2100"/>
                     </a:p>
                   </a:txBody>
-                  <a:tcPr marL="110868" marR="110868" marT="55434" marB="55434"/>
+                  <a:tcPr marL="105137" marR="105137" marT="52569" marB="52569"/>
                 </a:tc>
                 <a:extLst>
                   <a:ext uri="{0D108BD9-81ED-4DB2-BD59-A6C34878D82A}">
@@ -36832,19 +36844,19 @@
                   </a:ext>
                 </a:extLst>
               </a:tr>
-              <a:tr h="487818">
+              <a:tr h="457773">
                 <a:tc rowSpan="2">
                   <a:txBody>
                     <a:bodyPr/>
                     <a:lstStyle/>
                     <a:p>
                       <a:r>
-                        <a:rPr lang="en-US" sz="2200"/>
+                        <a:rPr lang="en-US" sz="2100"/>
                         <a:t>2</a:t>
                       </a:r>
                     </a:p>
                   </a:txBody>
-                  <a:tcPr marL="110868" marR="110868" marT="55434" marB="55434"/>
+                  <a:tcPr marL="105137" marR="105137" marT="52569" marB="52569"/>
                 </a:tc>
                 <a:tc>
                   <a:txBody>
@@ -36852,12 +36864,12 @@
                     <a:lstStyle/>
                     <a:p>
                       <a:r>
-                        <a:rPr lang="en-US" sz="2200"/>
+                        <a:rPr lang="en-US" sz="2100"/>
                         <a:t>Create Login Page</a:t>
                       </a:r>
                     </a:p>
                   </a:txBody>
-                  <a:tcPr marL="110868" marR="110868" marT="55434" marB="55434"/>
+                  <a:tcPr marL="105137" marR="105137" marT="52569" marB="52569"/>
                 </a:tc>
                 <a:tc>
                   <a:txBody>
@@ -36865,22 +36877,22 @@
                     <a:lstStyle/>
                     <a:p>
                       <a:r>
-                        <a:rPr lang="en-US" sz="2200"/>
+                        <a:rPr lang="en-US" sz="2100"/>
                         <a:t>7/7</a:t>
                       </a:r>
                     </a:p>
                   </a:txBody>
-                  <a:tcPr marL="110868" marR="110868" marT="55434" marB="55434"/>
+                  <a:tcPr marL="105137" marR="105137" marT="52569" marB="52569"/>
                 </a:tc>
                 <a:tc>
                   <a:txBody>
                     <a:bodyPr/>
                     <a:lstStyle/>
                     <a:p>
-                      <a:endParaRPr lang="en-US" sz="2200"/>
+                      <a:endParaRPr lang="en-US" sz="2100"/>
                     </a:p>
                   </a:txBody>
-                  <a:tcPr marL="110868" marR="110868" marT="55434" marB="55434"/>
+                  <a:tcPr marL="105137" marR="105137" marT="52569" marB="52569"/>
                 </a:tc>
                 <a:extLst>
                   <a:ext uri="{0D108BD9-81ED-4DB2-BD59-A6C34878D82A}">
@@ -36888,7 +36900,7 @@
                   </a:ext>
                 </a:extLst>
               </a:tr>
-              <a:tr h="487818">
+              <a:tr h="457773">
                 <a:tc vMerge="1">
                   <a:txBody>
                     <a:bodyPr/>
@@ -36905,12 +36917,12 @@
                     <a:lstStyle/>
                     <a:p>
                       <a:r>
-                        <a:rPr lang="en-US" sz="2200"/>
+                        <a:rPr lang="en-US" sz="2100"/>
                         <a:t>Implement Login Functionality</a:t>
                       </a:r>
                     </a:p>
                   </a:txBody>
-                  <a:tcPr marL="110868" marR="110868" marT="55434" marB="55434"/>
+                  <a:tcPr marL="105137" marR="105137" marT="52569" marB="52569"/>
                 </a:tc>
                 <a:tc>
                   <a:txBody>
@@ -36918,22 +36930,22 @@
                     <a:lstStyle/>
                     <a:p>
                       <a:r>
-                        <a:rPr lang="en-US" sz="2200"/>
+                        <a:rPr lang="en-US" sz="2100"/>
                         <a:t>7/7</a:t>
                       </a:r>
                     </a:p>
                   </a:txBody>
-                  <a:tcPr marL="110868" marR="110868" marT="55434" marB="55434"/>
+                  <a:tcPr marL="105137" marR="105137" marT="52569" marB="52569"/>
                 </a:tc>
                 <a:tc>
                   <a:txBody>
                     <a:bodyPr/>
                     <a:lstStyle/>
                     <a:p>
-                      <a:endParaRPr lang="en-US" sz="2200"/>
+                      <a:endParaRPr lang="en-US" sz="2100"/>
                     </a:p>
                   </a:txBody>
-                  <a:tcPr marL="110868" marR="110868" marT="55434" marB="55434"/>
+                  <a:tcPr marL="105137" marR="105137" marT="52569" marB="52569"/>
                 </a:tc>
                 <a:extLst>
                   <a:ext uri="{0D108BD9-81ED-4DB2-BD59-A6C34878D82A}">
@@ -36941,19 +36953,19 @@
                   </a:ext>
                 </a:extLst>
               </a:tr>
-              <a:tr h="487818">
+              <a:tr h="457773">
                 <a:tc rowSpan="3">
                   <a:txBody>
                     <a:bodyPr/>
                     <a:lstStyle/>
                     <a:p>
                       <a:r>
-                        <a:rPr lang="en-US" sz="2200"/>
+                        <a:rPr lang="en-US" sz="2100"/>
                         <a:t>3</a:t>
                       </a:r>
                     </a:p>
                   </a:txBody>
-                  <a:tcPr marL="110868" marR="110868" marT="55434" marB="55434"/>
+                  <a:tcPr marL="105137" marR="105137" marT="52569" marB="52569"/>
                 </a:tc>
                 <a:tc>
                   <a:txBody>
@@ -36961,12 +36973,12 @@
                     <a:lstStyle/>
                     <a:p>
                       <a:r>
-                        <a:rPr lang="en-US" sz="2200"/>
+                        <a:rPr lang="en-US" sz="2100"/>
                         <a:t>Create Employee Management Screen</a:t>
                       </a:r>
                     </a:p>
                   </a:txBody>
-                  <a:tcPr marL="110868" marR="110868" marT="55434" marB="55434"/>
+                  <a:tcPr marL="105137" marR="105137" marT="52569" marB="52569"/>
                 </a:tc>
                 <a:tc>
                   <a:txBody>
@@ -36974,22 +36986,22 @@
                     <a:lstStyle/>
                     <a:p>
                       <a:r>
-                        <a:rPr lang="en-US" sz="2200"/>
+                        <a:rPr lang="en-US" sz="2100"/>
                         <a:t>7/14</a:t>
                       </a:r>
                     </a:p>
                   </a:txBody>
-                  <a:tcPr marL="110868" marR="110868" marT="55434" marB="55434"/>
+                  <a:tcPr marL="105137" marR="105137" marT="52569" marB="52569"/>
                 </a:tc>
                 <a:tc>
                   <a:txBody>
                     <a:bodyPr/>
                     <a:lstStyle/>
                     <a:p>
-                      <a:endParaRPr lang="en-US" sz="2200"/>
+                      <a:endParaRPr lang="en-US" sz="2100"/>
                     </a:p>
                   </a:txBody>
-                  <a:tcPr marL="110868" marR="110868" marT="55434" marB="55434"/>
+                  <a:tcPr marL="105137" marR="105137" marT="52569" marB="52569"/>
                 </a:tc>
                 <a:extLst>
                   <a:ext uri="{0D108BD9-81ED-4DB2-BD59-A6C34878D82A}">
@@ -36997,7 +37009,7 @@
                   </a:ext>
                 </a:extLst>
               </a:tr>
-              <a:tr h="487818">
+              <a:tr h="457773">
                 <a:tc vMerge="1">
                   <a:txBody>
                     <a:bodyPr/>
@@ -37014,12 +37026,12 @@
                     <a:lstStyle/>
                     <a:p>
                       <a:r>
-                        <a:rPr lang="en-US" sz="2200"/>
+                        <a:rPr lang="en-US" sz="2100"/>
                         <a:t>Implement Employee Management Screen Population</a:t>
                       </a:r>
                     </a:p>
                   </a:txBody>
-                  <a:tcPr marL="110868" marR="110868" marT="55434" marB="55434"/>
+                  <a:tcPr marL="105137" marR="105137" marT="52569" marB="52569"/>
                 </a:tc>
                 <a:tc>
                   <a:txBody>
@@ -37027,22 +37039,22 @@
                     <a:lstStyle/>
                     <a:p>
                       <a:r>
-                        <a:rPr lang="en-US" sz="2200"/>
+                        <a:rPr lang="en-US" sz="2100"/>
                         <a:t>7/14</a:t>
                       </a:r>
                     </a:p>
                   </a:txBody>
-                  <a:tcPr marL="110868" marR="110868" marT="55434" marB="55434"/>
+                  <a:tcPr marL="105137" marR="105137" marT="52569" marB="52569"/>
                 </a:tc>
                 <a:tc>
                   <a:txBody>
                     <a:bodyPr/>
                     <a:lstStyle/>
                     <a:p>
-                      <a:endParaRPr lang="en-US" sz="2200"/>
+                      <a:endParaRPr lang="en-US" sz="2100"/>
                     </a:p>
                   </a:txBody>
-                  <a:tcPr marL="110868" marR="110868" marT="55434" marB="55434"/>
+                  <a:tcPr marL="105137" marR="105137" marT="52569" marB="52569"/>
                 </a:tc>
                 <a:extLst>
                   <a:ext uri="{0D108BD9-81ED-4DB2-BD59-A6C34878D82A}">
@@ -37050,7 +37062,7 @@
                   </a:ext>
                 </a:extLst>
               </a:tr>
-              <a:tr h="487818">
+              <a:tr h="457773">
                 <a:tc vMerge="1">
                   <a:txBody>
                     <a:bodyPr/>
@@ -37067,12 +37079,12 @@
                     <a:lstStyle/>
                     <a:p>
                       <a:r>
-                        <a:rPr lang="en-US" sz="2200"/>
+                        <a:rPr lang="en-US" sz="2100"/>
                         <a:t>Implement Employee Add/Remove/Edit</a:t>
                       </a:r>
                     </a:p>
                   </a:txBody>
-                  <a:tcPr marL="110868" marR="110868" marT="55434" marB="55434"/>
+                  <a:tcPr marL="105137" marR="105137" marT="52569" marB="52569"/>
                 </a:tc>
                 <a:tc>
                   <a:txBody>
@@ -37080,22 +37092,22 @@
                     <a:lstStyle/>
                     <a:p>
                       <a:r>
-                        <a:rPr lang="en-US" sz="2200"/>
+                        <a:rPr lang="en-US" sz="2100"/>
                         <a:t>7/14</a:t>
                       </a:r>
                     </a:p>
                   </a:txBody>
-                  <a:tcPr marL="110868" marR="110868" marT="55434" marB="55434"/>
+                  <a:tcPr marL="105137" marR="105137" marT="52569" marB="52569"/>
                 </a:tc>
                 <a:tc>
                   <a:txBody>
                     <a:bodyPr/>
                     <a:lstStyle/>
                     <a:p>
-                      <a:endParaRPr lang="en-US" sz="2200"/>
+                      <a:endParaRPr lang="en-US" sz="2100"/>
                     </a:p>
                   </a:txBody>
-                  <a:tcPr marL="110868" marR="110868" marT="55434" marB="55434"/>
+                  <a:tcPr marL="105137" marR="105137" marT="52569" marB="52569"/>
                 </a:tc>
                 <a:extLst>
                   <a:ext uri="{0D108BD9-81ED-4DB2-BD59-A6C34878D82A}">
@@ -37103,19 +37115,19 @@
                   </a:ext>
                 </a:extLst>
               </a:tr>
-              <a:tr h="487818">
+              <a:tr h="457773">
                 <a:tc>
                   <a:txBody>
                     <a:bodyPr/>
                     <a:lstStyle/>
                     <a:p>
                       <a:r>
-                        <a:rPr lang="en-US" sz="2200"/>
+                        <a:rPr lang="en-US" sz="2100"/>
                         <a:t>4</a:t>
                       </a:r>
                     </a:p>
                   </a:txBody>
-                  <a:tcPr marL="110868" marR="110868" marT="55434" marB="55434"/>
+                  <a:tcPr marL="105137" marR="105137" marT="52569" marB="52569"/>
                 </a:tc>
                 <a:tc>
                   <a:txBody>
@@ -37123,12 +37135,12 @@
                     <a:lstStyle/>
                     <a:p>
                       <a:r>
-                        <a:rPr lang="en-US" sz="2200"/>
+                        <a:rPr lang="en-US" sz="2100"/>
                         <a:t>Create Item Search Screen</a:t>
                       </a:r>
                     </a:p>
                   </a:txBody>
-                  <a:tcPr marL="110868" marR="110868" marT="55434" marB="55434"/>
+                  <a:tcPr marL="105137" marR="105137" marT="52569" marB="52569"/>
                 </a:tc>
                 <a:tc>
                   <a:txBody>
@@ -37136,22 +37148,22 @@
                     <a:lstStyle/>
                     <a:p>
                       <a:r>
-                        <a:rPr lang="en-US" sz="2200"/>
+                        <a:rPr lang="en-US" sz="2100"/>
                         <a:t>7/21</a:t>
                       </a:r>
                     </a:p>
                   </a:txBody>
-                  <a:tcPr marL="110868" marR="110868" marT="55434" marB="55434"/>
+                  <a:tcPr marL="105137" marR="105137" marT="52569" marB="52569"/>
                 </a:tc>
                 <a:tc>
                   <a:txBody>
                     <a:bodyPr/>
                     <a:lstStyle/>
                     <a:p>
-                      <a:endParaRPr lang="en-US" sz="2200"/>
+                      <a:endParaRPr lang="en-US" sz="2100" dirty="0"/>
                     </a:p>
                   </a:txBody>
-                  <a:tcPr marL="110868" marR="110868" marT="55434" marB="55434"/>
+                  <a:tcPr marL="105137" marR="105137" marT="52569" marB="52569"/>
                 </a:tc>
                 <a:extLst>
                   <a:ext uri="{0D108BD9-81ED-4DB2-BD59-A6C34878D82A}">
@@ -41255,20 +41267,20 @@
 </file>
 
 <file path=customXml/item1.xml><?xml version="1.0" encoding="utf-8"?>
+<p:properties xmlns:p="http://schemas.microsoft.com/office/2006/metadata/properties" xmlns:xsi="http://www.w3.org/2001/XMLSchema-instance" xmlns:pc="http://schemas.microsoft.com/office/infopath/2007/PartnerControls">
+  <documentManagement>
+    <_activity xmlns="23f13a88-bc19-4ee5-93e7-c707a117e443" xsi:nil="true"/>
+  </documentManagement>
+</p:properties>
+</file>
+
+<file path=customXml/item2.xml><?xml version="1.0" encoding="utf-8"?>
 <?mso-contentType ?>
 <FormTemplates xmlns="http://schemas.microsoft.com/sharepoint/v3/contenttype/forms">
   <Display>DocumentLibraryForm</Display>
   <Edit>DocumentLibraryForm</Edit>
   <New>DocumentLibraryForm</New>
 </FormTemplates>
-</file>
-
-<file path=customXml/item2.xml><?xml version="1.0" encoding="utf-8"?>
-<p:properties xmlns:p="http://schemas.microsoft.com/office/2006/metadata/properties" xmlns:xsi="http://www.w3.org/2001/XMLSchema-instance" xmlns:pc="http://schemas.microsoft.com/office/infopath/2007/PartnerControls">
-  <documentManagement>
-    <_activity xmlns="23f13a88-bc19-4ee5-93e7-c707a117e443" xsi:nil="true"/>
-  </documentManagement>
-</p:properties>
 </file>
 
 <file path=customXml/item3.xml><?xml version="1.0" encoding="utf-8"?>
@@ -41513,14 +41525,6 @@
 </file>
 
 <file path=customXml/itemProps1.xml><?xml version="1.0" encoding="utf-8"?>
-<ds:datastoreItem xmlns:ds="http://schemas.openxmlformats.org/officeDocument/2006/customXml" ds:itemID="{DDAE6670-C60F-4F99-A765-3E3C1042DA5F}">
-  <ds:schemaRefs>
-    <ds:schemaRef ds:uri="http://schemas.microsoft.com/sharepoint/v3/contenttype/forms"/>
-  </ds:schemaRefs>
-</ds:datastoreItem>
-</file>
-
-<file path=customXml/itemProps2.xml><?xml version="1.0" encoding="utf-8"?>
 <ds:datastoreItem xmlns:ds="http://schemas.openxmlformats.org/officeDocument/2006/customXml" ds:itemID="{4ADE20F0-19E8-4F42-9741-6C6D3D18888D}">
   <ds:schemaRefs>
     <ds:schemaRef ds:uri="http://www.w3.org/XML/1998/namespace"/>
@@ -41533,6 +41537,14 @@
     <ds:schemaRef ds:uri="http://schemas.microsoft.com/office/2006/metadata/properties"/>
     <ds:schemaRef ds:uri="315e62cf-cfca-4c88-a5b9-62c1bd004af9"/>
     <ds:schemaRef ds:uri="23f13a88-bc19-4ee5-93e7-c707a117e443"/>
+  </ds:schemaRefs>
+</ds:datastoreItem>
+</file>
+
+<file path=customXml/itemProps2.xml><?xml version="1.0" encoding="utf-8"?>
+<ds:datastoreItem xmlns:ds="http://schemas.openxmlformats.org/officeDocument/2006/customXml" ds:itemID="{DDAE6670-C60F-4F99-A765-3E3C1042DA5F}">
+  <ds:schemaRefs>
+    <ds:schemaRef ds:uri="http://schemas.microsoft.com/sharepoint/v3/contenttype/forms"/>
   </ds:schemaRefs>
 </ds:datastoreItem>
 </file>

</xml_diff>

<commit_message>
added login screen & database connection
</commit_message>
<xml_diff>
--- a/CIMS_Deliverables.pptx
+++ b/CIMS_Deliverables.pptx
@@ -252,7 +252,7 @@
   <pc:docChgLst>
     <pc:chgData name="David Dugan" userId="3832c9847a5a5709" providerId="LiveId" clId="{672E13CA-793E-4AAC-8600-4D455CE75F65}"/>
     <pc:docChg chg="undo redo custSel addSld delSld modSld addSection delSection modSection">
-      <pc:chgData name="David Dugan" userId="3832c9847a5a5709" providerId="LiveId" clId="{672E13CA-793E-4AAC-8600-4D455CE75F65}" dt="2024-07-08T14:08:11.898" v="4316" actId="26606"/>
+      <pc:chgData name="David Dugan" userId="3832c9847a5a5709" providerId="LiveId" clId="{672E13CA-793E-4AAC-8600-4D455CE75F65}" dt="2024-07-08T15:29:25.848" v="4336" actId="255"/>
       <pc:docMkLst>
         <pc:docMk/>
       </pc:docMkLst>
@@ -2549,7 +2549,7 @@
         </pc:picChg>
       </pc:sldChg>
       <pc:sldChg chg="addSp delSp modSp new mod setBg setFolMasterObjs setClrOvrMap">
-        <pc:chgData name="David Dugan" userId="3832c9847a5a5709" providerId="LiveId" clId="{672E13CA-793E-4AAC-8600-4D455CE75F65}" dt="2024-07-08T14:08:11.898" v="4316" actId="26606"/>
+        <pc:chgData name="David Dugan" userId="3832c9847a5a5709" providerId="LiveId" clId="{672E13CA-793E-4AAC-8600-4D455CE75F65}" dt="2024-07-08T15:29:25.848" v="4336" actId="255"/>
         <pc:sldMkLst>
           <pc:docMk/>
           <pc:sldMk cId="2181544156" sldId="290"/>
@@ -2707,7 +2707,7 @@
           </ac:spMkLst>
         </pc:spChg>
         <pc:graphicFrameChg chg="add mod modGraphic">
-          <ac:chgData name="David Dugan" userId="3832c9847a5a5709" providerId="LiveId" clId="{672E13CA-793E-4AAC-8600-4D455CE75F65}" dt="2024-07-08T14:08:11.898" v="4316" actId="26606"/>
+          <ac:chgData name="David Dugan" userId="3832c9847a5a5709" providerId="LiveId" clId="{672E13CA-793E-4AAC-8600-4D455CE75F65}" dt="2024-07-08T15:29:25.848" v="4336" actId="255"/>
           <ac:graphicFrameMkLst>
             <pc:docMk/>
             <pc:sldMk cId="2181544156" sldId="290"/>
@@ -36574,7 +36574,7 @@
           <p:nvPr>
             <p:extLst>
               <p:ext uri="{D42A27DB-BD31-4B8C-83A1-F6EECF244321}">
-                <p14:modId xmlns:p14="http://schemas.microsoft.com/office/powerpoint/2010/main" val="3063701712"/>
+                <p14:modId xmlns:p14="http://schemas.microsoft.com/office/powerpoint/2010/main" val="1601630420"/>
               </p:ext>
             </p:extLst>
           </p:nvPr>
@@ -36724,10 +36724,10 @@
                     <a:lstStyle/>
                     <a:p>
                       <a:r>
-                        <a:rPr lang="en-US" sz="1900"/>
+                        <a:rPr lang="en-US" sz="1900" dirty="0"/>
                         <a:t>COMPLETE</a:t>
                       </a:r>
-                      <a:endParaRPr lang="en-US" sz="2100"/>
+                      <a:endParaRPr lang="en-US" sz="2100" dirty="0"/>
                     </a:p>
                   </a:txBody>
                   <a:tcPr marL="105137" marR="105137" marT="52569" marB="52569"/>
@@ -36833,7 +36833,10 @@
                     <a:bodyPr/>
                     <a:lstStyle/>
                     <a:p>
-                      <a:endParaRPr lang="en-US" sz="2100"/>
+                      <a:r>
+                        <a:rPr lang="en-US" sz="1900" dirty="0"/>
+                        <a:t>COMPLETE</a:t>
+                      </a:r>
                     </a:p>
                   </a:txBody>
                   <a:tcPr marL="105137" marR="105137" marT="52569" marB="52569"/>
@@ -36889,7 +36892,10 @@
                     <a:bodyPr/>
                     <a:lstStyle/>
                     <a:p>
-                      <a:endParaRPr lang="en-US" sz="2100"/>
+                      <a:r>
+                        <a:rPr lang="en-US" sz="1900" dirty="0"/>
+                        <a:t>COMPLETE</a:t>
+                      </a:r>
                     </a:p>
                   </a:txBody>
                   <a:tcPr marL="105137" marR="105137" marT="52569" marB="52569"/>
@@ -41267,20 +41273,20 @@
 </file>
 
 <file path=customXml/item1.xml><?xml version="1.0" encoding="utf-8"?>
-<p:properties xmlns:p="http://schemas.microsoft.com/office/2006/metadata/properties" xmlns:xsi="http://www.w3.org/2001/XMLSchema-instance" xmlns:pc="http://schemas.microsoft.com/office/infopath/2007/PartnerControls">
-  <documentManagement>
-    <_activity xmlns="23f13a88-bc19-4ee5-93e7-c707a117e443" xsi:nil="true"/>
-  </documentManagement>
-</p:properties>
-</file>
-
-<file path=customXml/item2.xml><?xml version="1.0" encoding="utf-8"?>
 <?mso-contentType ?>
 <FormTemplates xmlns="http://schemas.microsoft.com/sharepoint/v3/contenttype/forms">
   <Display>DocumentLibraryForm</Display>
   <Edit>DocumentLibraryForm</Edit>
   <New>DocumentLibraryForm</New>
 </FormTemplates>
+</file>
+
+<file path=customXml/item2.xml><?xml version="1.0" encoding="utf-8"?>
+<p:properties xmlns:p="http://schemas.microsoft.com/office/2006/metadata/properties" xmlns:xsi="http://www.w3.org/2001/XMLSchema-instance" xmlns:pc="http://schemas.microsoft.com/office/infopath/2007/PartnerControls">
+  <documentManagement>
+    <_activity xmlns="23f13a88-bc19-4ee5-93e7-c707a117e443" xsi:nil="true"/>
+  </documentManagement>
+</p:properties>
 </file>
 
 <file path=customXml/item3.xml><?xml version="1.0" encoding="utf-8"?>
@@ -41525,6 +41531,14 @@
 </file>
 
 <file path=customXml/itemProps1.xml><?xml version="1.0" encoding="utf-8"?>
+<ds:datastoreItem xmlns:ds="http://schemas.openxmlformats.org/officeDocument/2006/customXml" ds:itemID="{DDAE6670-C60F-4F99-A765-3E3C1042DA5F}">
+  <ds:schemaRefs>
+    <ds:schemaRef ds:uri="http://schemas.microsoft.com/sharepoint/v3/contenttype/forms"/>
+  </ds:schemaRefs>
+</ds:datastoreItem>
+</file>
+
+<file path=customXml/itemProps2.xml><?xml version="1.0" encoding="utf-8"?>
 <ds:datastoreItem xmlns:ds="http://schemas.openxmlformats.org/officeDocument/2006/customXml" ds:itemID="{4ADE20F0-19E8-4F42-9741-6C6D3D18888D}">
   <ds:schemaRefs>
     <ds:schemaRef ds:uri="http://www.w3.org/XML/1998/namespace"/>
@@ -41537,14 +41551,6 @@
     <ds:schemaRef ds:uri="http://schemas.microsoft.com/office/2006/metadata/properties"/>
     <ds:schemaRef ds:uri="315e62cf-cfca-4c88-a5b9-62c1bd004af9"/>
     <ds:schemaRef ds:uri="23f13a88-bc19-4ee5-93e7-c707a117e443"/>
-  </ds:schemaRefs>
-</ds:datastoreItem>
-</file>
-
-<file path=customXml/itemProps2.xml><?xml version="1.0" encoding="utf-8"?>
-<ds:datastoreItem xmlns:ds="http://schemas.openxmlformats.org/officeDocument/2006/customXml" ds:itemID="{DDAE6670-C60F-4F99-A765-3E3C1042DA5F}">
-  <ds:schemaRefs>
-    <ds:schemaRef ds:uri="http://schemas.microsoft.com/sharepoint/v3/contenttype/forms"/>
   </ds:schemaRefs>
 </ds:datastoreItem>
 </file>

</xml_diff>